<commit_message>
Deploying to gh-pages from @ solsjo/bazel-pandoc-example@361838d162a609e0cec1aacc906ed3214bbf293b 🚀
</commit_message>
<xml_diff>
--- a/example.pptx
+++ b/example.pptx
@@ -3197,7 +3197,7 @@
             </a:pPr>
             <a:r>
               <a:rPr/>
-              <a:t>Slide 1.1</a:t>
+              <a:t>Slide 1</a:t>
             </a:r>
           </a:p>
         </p:txBody>
@@ -3313,7 +3313,7 @@
             </a:pPr>
             <a:r>
               <a:rPr/>
-              <a:t>Slide 1.2</a:t>
+              <a:t>Slide 2</a:t>
             </a:r>
           </a:p>
         </p:txBody>
@@ -3385,7 +3385,7 @@
             </a:pPr>
             <a:r>
               <a:rPr/>
-              <a:t>Slide 2</a:t>
+              <a:t>Slide 3</a:t>
             </a:r>
           </a:p>
         </p:txBody>

</xml_diff>